<commit_message>
Update source format: SUSE_Automotive_Manifesto
</commit_message>
<xml_diff>
--- a/source/whitepaper/SUSE_Automotive_Manifesto.pptx
+++ b/source/whitepaper/SUSE_Automotive_Manifesto.pptx
@@ -124,7 +124,7 @@
           <a:p>
             <a:fld id="{4B0C2AD8-DAFC-BB4F-9124-B93D700F5C67}" type="datetimeFigureOut">
               <a:rPr kumimoji="1" lang="zh-CN" altLang="en-US" smtClean="0"/>
-              <a:t>2023/5/29</a:t>
+              <a:t>2023/5/31</a:t>
             </a:fld>
             <a:endParaRPr kumimoji="1" lang="zh-CN" altLang="en-US"/>
           </a:p>
@@ -614,7 +614,7 @@
           <a:p>
             <a:fld id="{1D8BD707-D9CF-40AE-B4C6-C98DA3205C09}" type="datetimeFigureOut">
               <a:rPr lang="en-US"/>
-              <a:t>5/29/23</a:t>
+              <a:t>5/31/23</a:t>
             </a:fld>
             <a:endParaRPr lang="en-US"/>
           </a:p>
@@ -791,7 +791,7 @@
           <a:p>
             <a:fld id="{1D8BD707-D9CF-40AE-B4C6-C98DA3205C09}" type="datetimeFigureOut">
               <a:rPr lang="en-US"/>
-              <a:t>5/29/23</a:t>
+              <a:t>5/31/23</a:t>
             </a:fld>
             <a:endParaRPr lang="en-US"/>
           </a:p>
@@ -1013,7 +1013,7 @@
           <a:p>
             <a:fld id="{1D8BD707-D9CF-40AE-B4C6-C98DA3205C09}" type="datetimeFigureOut">
               <a:rPr lang="en-US"/>
-              <a:t>5/29/23</a:t>
+              <a:t>5/31/23</a:t>
             </a:fld>
             <a:endParaRPr lang="en-US"/>
           </a:p>
@@ -1161,7 +1161,7 @@
           <a:p>
             <a:fld id="{1D8BD707-D9CF-40AE-B4C6-C98DA3205C09}" type="datetimeFigureOut">
               <a:rPr lang="en-US"/>
-              <a:t>5/29/23</a:t>
+              <a:t>5/31/23</a:t>
             </a:fld>
             <a:endParaRPr lang="en-US"/>
           </a:p>
@@ -1576,7 +1576,7 @@
           <a:p>
             <a:fld id="{1D8BD707-D9CF-40AE-B4C6-C98DA3205C09}" type="datetimeFigureOut">
               <a:rPr lang="en-US"/>
-              <a:t>5/29/23</a:t>
+              <a:t>5/31/23</a:t>
             </a:fld>
             <a:endParaRPr lang="en-US"/>
           </a:p>
@@ -2023,7 +2023,7 @@
           <a:p>
             <a:fld id="{1D8BD707-D9CF-40AE-B4C6-C98DA3205C09}" type="datetimeFigureOut">
               <a:rPr lang="en-US"/>
-              <a:t>5/29/23</a:t>
+              <a:t>5/31/23</a:t>
             </a:fld>
             <a:endParaRPr lang="en-US"/>
           </a:p>
@@ -2325,46 +2325,38 @@
       </p:grpSp>
       <p:sp>
         <p:nvSpPr>
-          <p:cNvPr id="6" name="object 6"/>
-          <p:cNvSpPr txBox="1">
+          <p:cNvPr id="10" name="标题 9">
+            <a:extLst>
+              <a:ext uri="{FF2B5EF4-FFF2-40B4-BE49-F238E27FC236}">
+                <a16:creationId xmlns:a16="http://schemas.microsoft.com/office/drawing/2014/main" id="{B6113EA3-D3BE-46E4-AAC5-B0448E5DBB67}"/>
+              </a:ext>
+            </a:extLst>
+          </p:cNvPr>
+          <p:cNvSpPr>
             <a:spLocks noGrp="1"/>
           </p:cNvSpPr>
           <p:nvPr>
-            <p:ph type="body" idx="1"/>
+            <p:ph type="ctrTitle"/>
           </p:nvPr>
         </p:nvSpPr>
         <p:spPr>
           <a:xfrm>
-            <a:off x="802195" y="1935480"/>
-            <a:ext cx="18499708" cy="3349635"/>
+            <a:off x="10966450" y="3295650"/>
+            <a:ext cx="8925243" cy="1846659"/>
           </a:xfrm>
-          <a:prstGeom prst="rect">
-            <a:avLst/>
-          </a:prstGeom>
         </p:spPr>
         <p:txBody>
-          <a:bodyPr vert="horz" wrap="square" lIns="0" tIns="116840" rIns="0" bIns="0" rtlCol="0">
-            <a:spAutoFit/>
-          </a:bodyPr>
+          <a:bodyPr/>
           <a:lstStyle/>
           <a:p>
-            <a:pPr marL="10220325" marR="5080">
-              <a:lnSpc>
-                <a:spcPts val="7800"/>
-              </a:lnSpc>
-              <a:spcBef>
-                <a:spcPts val="920"/>
-              </a:spcBef>
-            </a:pPr>
-            <a:r>
-              <a:rPr dirty="0">
-                <a:latin typeface="Source Han Sans CN" panose="020B0500000000000000" pitchFamily="34" charset="-128"/>
-                <a:ea typeface="Source Han Sans CN" panose="020B0500000000000000" pitchFamily="34" charset="-128"/>
-              </a:rPr>
-              <a:t>From automotive
-to software-driven
-mobility</a:t>
-            </a:r>
+            <a:r>
+              <a:rPr lang="en" altLang="zh-CN" sz="6000" dirty="0">
+                <a:latin typeface="Source Han Sans CN" panose="020B0500000000000000" pitchFamily="34" charset="-128"/>
+                <a:ea typeface="Source Han Sans CN" panose="020B0500000000000000" pitchFamily="34" charset="-128"/>
+              </a:rPr>
+              <a:t>From automotive to software-driven mobility</a:t>
+            </a:r>
+            <a:endParaRPr lang="zh-CN" altLang="en-US" sz="6000" dirty="0"/>
           </a:p>
         </p:txBody>
       </p:sp>
@@ -2376,7 +2368,7 @@
         </p:nvSpPr>
         <p:spPr>
           <a:xfrm>
-            <a:off x="11022774" y="5691632"/>
+            <a:off x="10966450" y="5610528"/>
             <a:ext cx="7411276" cy="428322"/>
           </a:xfrm>
           <a:prstGeom prst="rect">
@@ -2398,7 +2390,7 @@
               </a:spcBef>
             </a:pPr>
             <a:r>
-              <a:rPr sz="2700" dirty="0">
+              <a:rPr lang="en" sz="2700" dirty="0">
                 <a:solidFill>
                   <a:srgbClr val="FFFFFF"/>
                 </a:solidFill>
@@ -2406,9 +2398,75 @@
                 <a:ea typeface="Source Han Sans CN" panose="020B0500000000000000" pitchFamily="34" charset="-128"/>
                 <a:cs typeface="Trebuchet MS"/>
               </a:rPr>
-              <a:t>Digitized. Innovative. Industry-leading.</a:t>
-            </a:r>
-            <a:endParaRPr sz="2700" dirty="0">
+              <a:t>Digitized</a:t>
+            </a:r>
+            <a:r>
+              <a:rPr lang="en-US" altLang="zh-CN" sz="2700" dirty="0">
+                <a:solidFill>
+                  <a:srgbClr val="FFFFFF"/>
+                </a:solidFill>
+                <a:latin typeface="Source Han Sans CN" panose="020B0500000000000000" pitchFamily="34" charset="-128"/>
+                <a:ea typeface="Source Han Sans CN" panose="020B0500000000000000" pitchFamily="34" charset="-128"/>
+                <a:cs typeface="Trebuchet MS"/>
+              </a:rPr>
+              <a:t>,</a:t>
+            </a:r>
+            <a:r>
+              <a:rPr lang="zh-CN" altLang="en-US" sz="2700" dirty="0">
+                <a:solidFill>
+                  <a:srgbClr val="FFFFFF"/>
+                </a:solidFill>
+                <a:latin typeface="Source Han Sans CN" panose="020B0500000000000000" pitchFamily="34" charset="-128"/>
+                <a:ea typeface="Source Han Sans CN" panose="020B0500000000000000" pitchFamily="34" charset="-128"/>
+                <a:cs typeface="Trebuchet MS"/>
+              </a:rPr>
+              <a:t> </a:t>
+            </a:r>
+            <a:r>
+              <a:rPr lang="en" sz="2700" dirty="0">
+                <a:solidFill>
+                  <a:srgbClr val="FFFFFF"/>
+                </a:solidFill>
+                <a:latin typeface="Source Han Sans CN" panose="020B0500000000000000" pitchFamily="34" charset="-128"/>
+                <a:ea typeface="Source Han Sans CN" panose="020B0500000000000000" pitchFamily="34" charset="-128"/>
+                <a:cs typeface="Trebuchet MS"/>
+              </a:rPr>
+              <a:t>Innovative</a:t>
+            </a:r>
+            <a:r>
+              <a:rPr lang="en-US" altLang="zh-CN" sz="2700" dirty="0">
+                <a:solidFill>
+                  <a:srgbClr val="FFFFFF"/>
+                </a:solidFill>
+                <a:latin typeface="Source Han Sans CN" panose="020B0500000000000000" pitchFamily="34" charset="-128"/>
+                <a:ea typeface="Source Han Sans CN" panose="020B0500000000000000" pitchFamily="34" charset="-128"/>
+                <a:cs typeface="Trebuchet MS"/>
+              </a:rPr>
+              <a:t>,</a:t>
+            </a:r>
+            <a:r>
+              <a:rPr lang="zh-CN" altLang="en-US" sz="2700" dirty="0">
+                <a:solidFill>
+                  <a:srgbClr val="FFFFFF"/>
+                </a:solidFill>
+                <a:latin typeface="Source Han Sans CN" panose="020B0500000000000000" pitchFamily="34" charset="-128"/>
+                <a:ea typeface="Source Han Sans CN" panose="020B0500000000000000" pitchFamily="34" charset="-128"/>
+                <a:cs typeface="Trebuchet MS"/>
+              </a:rPr>
+              <a:t> </a:t>
+            </a:r>
+            <a:r>
+              <a:rPr lang="en" sz="2700" dirty="0">
+                <a:solidFill>
+                  <a:srgbClr val="FFFFFF"/>
+                </a:solidFill>
+                <a:latin typeface="Source Han Sans CN" panose="020B0500000000000000" pitchFamily="34" charset="-128"/>
+                <a:ea typeface="Source Han Sans CN" panose="020B0500000000000000" pitchFamily="34" charset="-128"/>
+                <a:cs typeface="Trebuchet MS"/>
+              </a:rPr>
+              <a:t>Industry-leading</a:t>
+            </a:r>
+            <a:endParaRPr lang="en" sz="2700" dirty="0">
               <a:latin typeface="Source Han Sans CN" panose="020B0500000000000000" pitchFamily="34" charset="-128"/>
               <a:ea typeface="Source Han Sans CN" panose="020B0500000000000000" pitchFamily="34" charset="-128"/>
               <a:cs typeface="Trebuchet MS"/>
@@ -2705,96 +2763,81 @@
           </a:prstGeom>
         </p:spPr>
       </p:pic>
-      <p:grpSp>
-        <p:nvGrpSpPr>
-          <p:cNvPr id="9" name="object 9"/>
-          <p:cNvGrpSpPr/>
+      <p:sp>
+        <p:nvSpPr>
+          <p:cNvPr id="10" name="object 10"/>
+          <p:cNvSpPr/>
           <p:nvPr/>
-        </p:nvGrpSpPr>
-        <p:grpSpPr>
+        </p:nvSpPr>
+        <p:spPr>
           <a:xfrm>
-            <a:off x="0" y="139870"/>
+            <a:off x="-9088" y="136915"/>
             <a:ext cx="8523605" cy="11182985"/>
-            <a:chOff x="0" y="125730"/>
-            <a:chExt cx="8523605" cy="11182985"/>
           </a:xfrm>
-        </p:grpSpPr>
-        <p:sp>
-          <p:nvSpPr>
-            <p:cNvPr id="10" name="object 10"/>
-            <p:cNvSpPr/>
-            <p:nvPr/>
-          </p:nvSpPr>
-          <p:spPr>
-            <a:xfrm>
-              <a:off x="0" y="125730"/>
-              <a:ext cx="8523605" cy="11182985"/>
-            </a:xfrm>
-            <a:custGeom>
-              <a:avLst/>
-              <a:gdLst/>
-              <a:ahLst/>
-              <a:cxnLst/>
-              <a:rect l="l" t="t" r="r" b="b"/>
-              <a:pathLst>
-                <a:path w="8523605" h="11182985">
-                  <a:moveTo>
-                    <a:pt x="8523300" y="0"/>
-                  </a:moveTo>
-                  <a:lnTo>
-                    <a:pt x="0" y="0"/>
-                  </a:lnTo>
-                  <a:lnTo>
-                    <a:pt x="0" y="11182827"/>
-                  </a:lnTo>
-                  <a:lnTo>
-                    <a:pt x="8523300" y="11182827"/>
-                  </a:lnTo>
-                  <a:lnTo>
-                    <a:pt x="8523300" y="0"/>
-                  </a:lnTo>
-                  <a:close/>
-                </a:path>
-              </a:pathLst>
-            </a:custGeom>
-            <a:solidFill>
-              <a:srgbClr val="0D332B"/>
-            </a:solidFill>
-          </p:spPr>
-          <p:txBody>
-            <a:bodyPr wrap="square" lIns="0" tIns="0" rIns="0" bIns="0" rtlCol="0"/>
-            <a:lstStyle/>
-            <a:p>
-              <a:endParaRPr>
-                <a:latin typeface="Source Han Sans CN" panose="020B0500000000000000" pitchFamily="34" charset="-128"/>
-                <a:ea typeface="Source Han Sans CN" panose="020B0500000000000000" pitchFamily="34" charset="-128"/>
-              </a:endParaRPr>
-            </a:p>
-          </p:txBody>
-        </p:sp>
-        <p:pic>
-          <p:nvPicPr>
-            <p:cNvPr id="11" name="object 11"/>
-            <p:cNvPicPr/>
-            <p:nvPr/>
-          </p:nvPicPr>
-          <p:blipFill>
-            <a:blip r:embed="rId3" cstate="print"/>
-            <a:stretch>
-              <a:fillRect/>
-            </a:stretch>
-          </p:blipFill>
-          <p:spPr>
-            <a:xfrm>
-              <a:off x="865632" y="905256"/>
-              <a:ext cx="1673352" cy="304800"/>
-            </a:xfrm>
-            <a:prstGeom prst="rect">
-              <a:avLst/>
-            </a:prstGeom>
-          </p:spPr>
-        </p:pic>
-      </p:grpSp>
+          <a:custGeom>
+            <a:avLst/>
+            <a:gdLst/>
+            <a:ahLst/>
+            <a:cxnLst/>
+            <a:rect l="l" t="t" r="r" b="b"/>
+            <a:pathLst>
+              <a:path w="8523605" h="11182985">
+                <a:moveTo>
+                  <a:pt x="8523300" y="0"/>
+                </a:moveTo>
+                <a:lnTo>
+                  <a:pt x="0" y="0"/>
+                </a:lnTo>
+                <a:lnTo>
+                  <a:pt x="0" y="11182827"/>
+                </a:lnTo>
+                <a:lnTo>
+                  <a:pt x="8523300" y="11182827"/>
+                </a:lnTo>
+                <a:lnTo>
+                  <a:pt x="8523300" y="0"/>
+                </a:lnTo>
+                <a:close/>
+              </a:path>
+            </a:pathLst>
+          </a:custGeom>
+          <a:solidFill>
+            <a:srgbClr val="0D332B"/>
+          </a:solidFill>
+        </p:spPr>
+        <p:txBody>
+          <a:bodyPr wrap="square" lIns="0" tIns="0" rIns="0" bIns="0" rtlCol="0"/>
+          <a:lstStyle/>
+          <a:p>
+            <a:endParaRPr dirty="0">
+              <a:latin typeface="Source Han Sans CN" panose="020B0500000000000000" pitchFamily="34" charset="-128"/>
+              <a:ea typeface="Source Han Sans CN" panose="020B0500000000000000" pitchFamily="34" charset="-128"/>
+            </a:endParaRPr>
+          </a:p>
+        </p:txBody>
+      </p:sp>
+      <p:pic>
+        <p:nvPicPr>
+          <p:cNvPr id="11" name="object 11"/>
+          <p:cNvPicPr/>
+          <p:nvPr/>
+        </p:nvPicPr>
+        <p:blipFill>
+          <a:blip r:embed="rId3" cstate="print"/>
+          <a:stretch>
+            <a:fillRect/>
+          </a:stretch>
+        </p:blipFill>
+        <p:spPr>
+          <a:xfrm>
+            <a:off x="865632" y="919396"/>
+            <a:ext cx="1673352" cy="304800"/>
+          </a:xfrm>
+          <a:prstGeom prst="rect">
+            <a:avLst/>
+          </a:prstGeom>
+        </p:spPr>
+      </p:pic>
       <p:sp>
         <p:nvSpPr>
           <p:cNvPr id="12" name="object 12"/>
@@ -2922,7 +2965,7 @@
         <p:spPr>
           <a:xfrm>
             <a:off x="10449941" y="2430282"/>
-            <a:ext cx="4628515" cy="1139158"/>
+            <a:ext cx="4628515" cy="1320916"/>
           </a:xfrm>
           <a:prstGeom prst="rect">
             <a:avLst/>
@@ -2932,7 +2975,7 @@
           </a:solidFill>
         </p:spPr>
         <p:txBody>
-          <a:bodyPr vert="horz" wrap="square" lIns="0" tIns="117475" rIns="0" bIns="0" rtlCol="0">
+          <a:bodyPr vert="horz" wrap="square" lIns="0" tIns="117475" rIns="0" bIns="180000" rtlCol="0">
             <a:spAutoFit/>
           </a:bodyPr>
           <a:lstStyle/>
@@ -3039,7 +3082,7 @@
         <p:spPr>
           <a:xfrm>
             <a:off x="10449941" y="3928435"/>
-            <a:ext cx="4628515" cy="1409938"/>
+            <a:ext cx="4628515" cy="1591696"/>
           </a:xfrm>
           <a:prstGeom prst="rect">
             <a:avLst/>
@@ -3049,7 +3092,7 @@
           </a:solidFill>
         </p:spPr>
         <p:txBody>
-          <a:bodyPr vert="horz" wrap="square" lIns="0" tIns="117475" rIns="0" bIns="0" rtlCol="0">
+          <a:bodyPr vert="horz" wrap="square" lIns="0" tIns="117475" rIns="0" bIns="180000" rtlCol="0">
             <a:spAutoFit/>
           </a:bodyPr>
           <a:lstStyle/>
@@ -3211,7 +3254,7 @@
         <p:spPr>
           <a:xfrm>
             <a:off x="10449941" y="5700391"/>
-            <a:ext cx="4628515" cy="1139799"/>
+            <a:ext cx="4628515" cy="1321557"/>
           </a:xfrm>
           <a:prstGeom prst="rect">
             <a:avLst/>
@@ -3221,7 +3264,7 @@
           </a:solidFill>
         </p:spPr>
         <p:txBody>
-          <a:bodyPr vert="horz" wrap="square" lIns="0" tIns="118110" rIns="0" bIns="0" rtlCol="0">
+          <a:bodyPr vert="horz" wrap="square" lIns="0" tIns="118110" rIns="0" bIns="180000" rtlCol="0">
             <a:spAutoFit/>
           </a:bodyPr>
           <a:lstStyle/>
@@ -3350,7 +3393,7 @@
         <p:spPr>
           <a:xfrm>
             <a:off x="10449941" y="7250888"/>
-            <a:ext cx="4628515" cy="1140440"/>
+            <a:ext cx="4628515" cy="1322198"/>
           </a:xfrm>
           <a:prstGeom prst="rect">
             <a:avLst/>
@@ -3360,7 +3403,7 @@
           </a:solidFill>
         </p:spPr>
         <p:txBody>
-          <a:bodyPr vert="horz" wrap="square" lIns="0" tIns="118745" rIns="0" bIns="0" rtlCol="0">
+          <a:bodyPr vert="horz" wrap="square" lIns="0" tIns="118745" rIns="0" bIns="180000" rtlCol="0">
             <a:spAutoFit/>
           </a:bodyPr>
           <a:lstStyle/>
@@ -3467,7 +3510,7 @@
         <p:spPr>
           <a:xfrm>
             <a:off x="10449941" y="8801396"/>
-            <a:ext cx="4628515" cy="1138516"/>
+            <a:ext cx="4628515" cy="1320274"/>
           </a:xfrm>
           <a:prstGeom prst="rect">
             <a:avLst/>
@@ -3477,7 +3520,7 @@
           </a:solidFill>
         </p:spPr>
         <p:txBody>
-          <a:bodyPr vert="horz" wrap="square" lIns="0" tIns="116839" rIns="0" bIns="0" rtlCol="0">
+          <a:bodyPr vert="horz" wrap="square" lIns="0" tIns="116839" rIns="0" bIns="180000" rtlCol="0">
             <a:spAutoFit/>
           </a:bodyPr>
           <a:lstStyle/>
@@ -3584,7 +3627,7 @@
         <p:spPr>
           <a:xfrm>
             <a:off x="730731" y="5215127"/>
-            <a:ext cx="3560445" cy="4736425"/>
+            <a:ext cx="3560445" cy="4723601"/>
           </a:xfrm>
           <a:prstGeom prst="rect">
             <a:avLst/>
@@ -3734,8 +3777,40 @@
                 <a:ea typeface="Source Han Sans CN" panose="020B0500000000000000" pitchFamily="34" charset="-128"/>
                 <a:cs typeface="Lucida Sans Unicode"/>
               </a:rPr>
-              <a:t>utonomous,
-</a:t>
+              <a:t>utonomous,</a:t>
+            </a:r>
+            <a:r>
+              <a:rPr lang="zh-CN" altLang="en-US" sz="1700">
+                <a:solidFill>
+                  <a:srgbClr val="FFFFFF"/>
+                </a:solidFill>
+                <a:latin typeface="Source Han Sans CN" panose="020B0500000000000000" pitchFamily="34" charset="-128"/>
+                <a:ea typeface="Source Han Sans CN" panose="020B0500000000000000" pitchFamily="34" charset="-128"/>
+                <a:cs typeface="Lucida Sans Unicode"/>
+              </a:rPr>
+              <a:t> </a:t>
+            </a:r>
+            <a:r>
+              <a:rPr sz="1700">
+                <a:solidFill>
+                  <a:srgbClr val="FFFFFF"/>
+                </a:solidFill>
+                <a:latin typeface="Source Han Sans CN" panose="020B0500000000000000" pitchFamily="34" charset="-128"/>
+                <a:ea typeface="Source Han Sans CN" panose="020B0500000000000000" pitchFamily="34" charset="-128"/>
+                <a:cs typeface="Trebuchet MS"/>
+              </a:rPr>
+              <a:t>S</a:t>
+            </a:r>
+            <a:r>
+              <a:rPr sz="1700">
+                <a:solidFill>
+                  <a:srgbClr val="FFFFFF"/>
+                </a:solidFill>
+                <a:latin typeface="Source Han Sans CN" panose="020B0500000000000000" pitchFamily="34" charset="-128"/>
+                <a:ea typeface="Source Han Sans CN" panose="020B0500000000000000" pitchFamily="34" charset="-128"/>
+                <a:cs typeface="Lucida Sans Unicode"/>
+              </a:rPr>
+              <a:t>hared </a:t>
             </a:r>
             <a:r>
               <a:rPr sz="1700" dirty="0">
@@ -3744,20 +3819,9 @@
                 </a:solidFill>
                 <a:latin typeface="Source Han Sans CN" panose="020B0500000000000000" pitchFamily="34" charset="-128"/>
                 <a:ea typeface="Source Han Sans CN" panose="020B0500000000000000" pitchFamily="34" charset="-128"/>
-                <a:cs typeface="Trebuchet MS"/>
-              </a:rPr>
-              <a:t>S</a:t>
-            </a:r>
-            <a:r>
-              <a:rPr sz="1700" dirty="0">
-                <a:solidFill>
-                  <a:srgbClr val="FFFFFF"/>
-                </a:solidFill>
-                <a:latin typeface="Source Han Sans CN" panose="020B0500000000000000" pitchFamily="34" charset="-128"/>
-                <a:ea typeface="Source Han Sans CN" panose="020B0500000000000000" pitchFamily="34" charset="-128"/>
-                <a:cs typeface="Lucida Sans Unicode"/>
-              </a:rPr>
-              <a:t>hared and </a:t>
+                <a:cs typeface="Lucida Sans Unicode"/>
+              </a:rPr>
+              <a:t>and </a:t>
             </a:r>
             <a:r>
               <a:rPr sz="1700" dirty="0">
@@ -4278,127 +4342,59 @@
           </a:p>
         </p:txBody>
       </p:sp>
-      <p:grpSp>
-        <p:nvGrpSpPr>
-          <p:cNvPr id="28" name="object 28"/>
-          <p:cNvGrpSpPr/>
+      <p:sp>
+        <p:nvSpPr>
+          <p:cNvPr id="29" name="object 29"/>
+          <p:cNvSpPr/>
           <p:nvPr/>
-        </p:nvGrpSpPr>
-        <p:grpSpPr>
+        </p:nvSpPr>
+        <p:spPr>
           <a:xfrm>
-            <a:off x="4649072" y="5381773"/>
+            <a:off x="4653116" y="6428224"/>
             <a:ext cx="3599815" cy="3374390"/>
-            <a:chOff x="4649072" y="5381773"/>
-            <a:chExt cx="3599815" cy="3374390"/>
           </a:xfrm>
-        </p:grpSpPr>
-        <p:sp>
-          <p:nvSpPr>
-            <p:cNvPr id="29" name="object 29"/>
-            <p:cNvSpPr/>
-            <p:nvPr/>
-          </p:nvSpPr>
-          <p:spPr>
-            <a:xfrm>
-              <a:off x="4649072" y="5381773"/>
-              <a:ext cx="3599815" cy="3374390"/>
-            </a:xfrm>
-            <a:custGeom>
-              <a:avLst/>
-              <a:gdLst/>
-              <a:ahLst/>
-              <a:cxnLst/>
-              <a:rect l="l" t="t" r="r" b="b"/>
-              <a:pathLst>
-                <a:path w="3599815" h="3374390">
-                  <a:moveTo>
-                    <a:pt x="3599813" y="0"/>
-                  </a:moveTo>
-                  <a:lnTo>
-                    <a:pt x="0" y="0"/>
-                  </a:lnTo>
-                  <a:lnTo>
-                    <a:pt x="0" y="3374388"/>
-                  </a:lnTo>
-                  <a:lnTo>
-                    <a:pt x="3599813" y="3374388"/>
-                  </a:lnTo>
-                  <a:lnTo>
-                    <a:pt x="3599813" y="0"/>
-                  </a:lnTo>
-                  <a:close/>
-                </a:path>
-              </a:pathLst>
-            </a:custGeom>
-            <a:solidFill>
-              <a:srgbClr val="CFD6D5"/>
-            </a:solidFill>
-          </p:spPr>
-          <p:txBody>
-            <a:bodyPr wrap="square" lIns="0" tIns="0" rIns="0" bIns="0" rtlCol="0"/>
-            <a:lstStyle/>
-            <a:p>
-              <a:endParaRPr>
-                <a:latin typeface="Source Han Sans CN" panose="020B0500000000000000" pitchFamily="34" charset="-128"/>
-                <a:ea typeface="Source Han Sans CN" panose="020B0500000000000000" pitchFamily="34" charset="-128"/>
-              </a:endParaRPr>
-            </a:p>
-          </p:txBody>
-        </p:sp>
-        <p:sp>
-          <p:nvSpPr>
-            <p:cNvPr id="30" name="object 30"/>
-            <p:cNvSpPr/>
-            <p:nvPr/>
-          </p:nvSpPr>
-          <p:spPr>
-            <a:xfrm>
-              <a:off x="5045072" y="8130687"/>
-              <a:ext cx="2628900" cy="12700"/>
-            </a:xfrm>
-            <a:custGeom>
-              <a:avLst/>
-              <a:gdLst/>
-              <a:ahLst/>
-              <a:cxnLst/>
-              <a:rect l="l" t="t" r="r" b="b"/>
-              <a:pathLst>
-                <a:path w="2628900" h="12700">
-                  <a:moveTo>
-                    <a:pt x="2628900" y="0"/>
-                  </a:moveTo>
-                  <a:lnTo>
-                    <a:pt x="0" y="0"/>
-                  </a:lnTo>
-                  <a:lnTo>
-                    <a:pt x="0" y="12700"/>
-                  </a:lnTo>
-                  <a:lnTo>
-                    <a:pt x="2628900" y="12700"/>
-                  </a:lnTo>
-                  <a:lnTo>
-                    <a:pt x="2628900" y="0"/>
-                  </a:lnTo>
-                  <a:close/>
-                </a:path>
-              </a:pathLst>
-            </a:custGeom>
-            <a:solidFill>
-              <a:srgbClr val="2453FF"/>
-            </a:solidFill>
-          </p:spPr>
-          <p:txBody>
-            <a:bodyPr wrap="square" lIns="0" tIns="0" rIns="0" bIns="0" rtlCol="0"/>
-            <a:lstStyle/>
-            <a:p>
-              <a:endParaRPr>
-                <a:latin typeface="Source Han Sans CN" panose="020B0500000000000000" pitchFamily="34" charset="-128"/>
-                <a:ea typeface="Source Han Sans CN" panose="020B0500000000000000" pitchFamily="34" charset="-128"/>
-              </a:endParaRPr>
-            </a:p>
-          </p:txBody>
-        </p:sp>
-      </p:grpSp>
+          <a:custGeom>
+            <a:avLst/>
+            <a:gdLst/>
+            <a:ahLst/>
+            <a:cxnLst/>
+            <a:rect l="l" t="t" r="r" b="b"/>
+            <a:pathLst>
+              <a:path w="3599815" h="3374390">
+                <a:moveTo>
+                  <a:pt x="3599813" y="0"/>
+                </a:moveTo>
+                <a:lnTo>
+                  <a:pt x="0" y="0"/>
+                </a:lnTo>
+                <a:lnTo>
+                  <a:pt x="0" y="3374388"/>
+                </a:lnTo>
+                <a:lnTo>
+                  <a:pt x="3599813" y="3374388"/>
+                </a:lnTo>
+                <a:lnTo>
+                  <a:pt x="3599813" y="0"/>
+                </a:lnTo>
+                <a:close/>
+              </a:path>
+            </a:pathLst>
+          </a:custGeom>
+          <a:solidFill>
+            <a:srgbClr val="CFD6D5"/>
+          </a:solidFill>
+        </p:spPr>
+        <p:txBody>
+          <a:bodyPr wrap="square" lIns="0" tIns="0" rIns="0" bIns="0" rtlCol="0"/>
+          <a:lstStyle/>
+          <a:p>
+            <a:endParaRPr dirty="0">
+              <a:latin typeface="Source Han Sans CN" panose="020B0500000000000000" pitchFamily="34" charset="-128"/>
+              <a:ea typeface="Source Han Sans CN" panose="020B0500000000000000" pitchFamily="34" charset="-128"/>
+            </a:endParaRPr>
+          </a:p>
+        </p:txBody>
+      </p:sp>
       <p:sp>
         <p:nvSpPr>
           <p:cNvPr id="31" name="object 31"/>
@@ -4407,8 +4403,8 @@
         </p:nvSpPr>
         <p:spPr>
           <a:xfrm>
-            <a:off x="4649072" y="5381773"/>
-            <a:ext cx="3599815" cy="2817759"/>
+            <a:off x="4636717" y="5971979"/>
+            <a:ext cx="3599815" cy="3681136"/>
           </a:xfrm>
           <a:prstGeom prst="rect">
             <a:avLst/>
@@ -4437,7 +4433,7 @@
           <a:p>
             <a:pPr marL="395605" marR="419734">
               <a:lnSpc>
-                <a:spcPct val="99300"/>
+                <a:spcPct val="150000"/>
               </a:lnSpc>
             </a:pPr>
             <a:r>
@@ -4577,7 +4573,7 @@
               <a:t> </a:t>
             </a:r>
             <a:r>
-              <a:rPr sz="2200" u="sng" dirty="0">
+              <a:rPr sz="2200" u="sng">
                 <a:solidFill>
                   <a:srgbClr val="2453FF"/>
                 </a:solidFill>
@@ -4591,7 +4587,24 @@
                 <a:cs typeface="Trebuchet MS"/>
                 <a:hlinkClick r:id="rId5"/>
               </a:rPr>
-              <a:t>within   a few years.</a:t>
+              <a:t>within  </a:t>
+            </a:r>
+            <a:r>
+              <a:rPr sz="2200" u="sng" dirty="0">
+                <a:solidFill>
+                  <a:srgbClr val="2453FF"/>
+                </a:solidFill>
+                <a:uFill>
+                  <a:solidFill>
+                    <a:srgbClr val="2453FF"/>
+                  </a:solidFill>
+                </a:uFill>
+                <a:latin typeface="Source Han Sans CN" panose="020B0500000000000000" pitchFamily="34" charset="-128"/>
+                <a:ea typeface="Source Han Sans CN" panose="020B0500000000000000" pitchFamily="34" charset="-128"/>
+                <a:cs typeface="Trebuchet MS"/>
+                <a:hlinkClick r:id="rId5"/>
+              </a:rPr>
+              <a:t>a few years.</a:t>
             </a:r>
             <a:endParaRPr sz="2200" dirty="0">
               <a:latin typeface="Source Han Sans CN" panose="020B0500000000000000" pitchFamily="34" charset="-128"/>
@@ -5038,8 +5051,8 @@
         </p:nvSpPr>
         <p:spPr>
           <a:xfrm>
-            <a:off x="15924772" y="6982610"/>
-            <a:ext cx="3599815" cy="2625527"/>
+            <a:off x="15926793" y="6634234"/>
+            <a:ext cx="3599815" cy="3133358"/>
           </a:xfrm>
           <a:prstGeom prst="rect">
             <a:avLst/>
@@ -5065,7 +5078,7 @@
           <a:p>
             <a:pPr marL="415290" marR="452755" indent="-75565">
               <a:lnSpc>
-                <a:spcPct val="100499"/>
+                <a:spcPct val="150000"/>
               </a:lnSpc>
               <a:spcBef>
                 <a:spcPts val="2300"/>
@@ -10090,7 +10103,7 @@
         <p:spPr>
           <a:xfrm>
             <a:off x="730731" y="5190744"/>
-            <a:ext cx="3514090" cy="4903137"/>
+            <a:ext cx="3514090" cy="4736425"/>
           </a:xfrm>
           <a:prstGeom prst="rect">
             <a:avLst/>
@@ -10163,8 +10176,29 @@
                 <a:ea typeface="Source Han Sans CN" panose="020B0500000000000000" pitchFamily="34" charset="-128"/>
                 <a:cs typeface="Lucida Sans Unicode"/>
               </a:rPr>
-              <a:t>automotive sector. It will enable
-simpler partnerships and</a:t>
+              <a:t>automotive sector. It will enable</a:t>
+            </a:r>
+            <a:r>
+              <a:rPr lang="zh-CN" altLang="en-US" sz="1700" dirty="0">
+                <a:solidFill>
+                  <a:srgbClr val="FFFFFF"/>
+                </a:solidFill>
+                <a:latin typeface="Source Han Sans CN" panose="020B0500000000000000" pitchFamily="34" charset="-128"/>
+                <a:ea typeface="Source Han Sans CN" panose="020B0500000000000000" pitchFamily="34" charset="-128"/>
+                <a:cs typeface="Lucida Sans Unicode"/>
+              </a:rPr>
+              <a:t> </a:t>
+            </a:r>
+            <a:r>
+              <a:rPr sz="1700" dirty="0">
+                <a:solidFill>
+                  <a:srgbClr val="FFFFFF"/>
+                </a:solidFill>
+                <a:latin typeface="Source Han Sans CN" panose="020B0500000000000000" pitchFamily="34" charset="-128"/>
+                <a:ea typeface="Source Han Sans CN" panose="020B0500000000000000" pitchFamily="34" charset="-128"/>
+                <a:cs typeface="Lucida Sans Unicode"/>
+              </a:rPr>
+              <a:t>simpler partnerships and</a:t>
             </a:r>
             <a:r>
               <a:rPr lang="zh-CN" altLang="en-US" sz="1700" dirty="0">
@@ -10799,7 +10833,7 @@
         <p:spPr>
           <a:xfrm>
             <a:off x="4969597" y="6454786"/>
-            <a:ext cx="3001645" cy="2375074"/>
+            <a:ext cx="3001645" cy="823302"/>
           </a:xfrm>
           <a:prstGeom prst="rect">
             <a:avLst/>
@@ -10829,107 +10863,6 @@
                 <a:cs typeface="Lucida Sans Unicode"/>
               </a:rPr>
               <a:t>56m+</a:t>
-            </a:r>
-            <a:endParaRPr sz="4600" dirty="0">
-              <a:latin typeface="Source Han Sans CN" panose="020B0500000000000000" pitchFamily="34" charset="-128"/>
-              <a:ea typeface="Source Han Sans CN" panose="020B0500000000000000" pitchFamily="34" charset="-128"/>
-              <a:cs typeface="Lucida Sans Unicode"/>
-            </a:endParaRPr>
-          </a:p>
-          <a:p>
-            <a:pPr marL="66675" marR="5080">
-              <a:lnSpc>
-                <a:spcPct val="98600"/>
-              </a:lnSpc>
-              <a:spcBef>
-                <a:spcPts val="420"/>
-              </a:spcBef>
-            </a:pPr>
-            <a:r>
-              <a:rPr sz="2200" dirty="0">
-                <a:solidFill>
-                  <a:srgbClr val="8FEBCC"/>
-                </a:solidFill>
-                <a:latin typeface="Source Han Sans CN" panose="020B0500000000000000" pitchFamily="34" charset="-128"/>
-                <a:ea typeface="Source Han Sans CN" panose="020B0500000000000000" pitchFamily="34" charset="-128"/>
-                <a:cs typeface="Trebuchet MS"/>
-              </a:rPr>
-              <a:t>developers contribute</a:t>
-            </a:r>
-            <a:r>
-              <a:rPr lang="zh-CN" altLang="en-US" sz="2200" dirty="0">
-                <a:solidFill>
-                  <a:srgbClr val="8FEBCC"/>
-                </a:solidFill>
-                <a:latin typeface="Source Han Sans CN" panose="020B0500000000000000" pitchFamily="34" charset="-128"/>
-                <a:ea typeface="Source Han Sans CN" panose="020B0500000000000000" pitchFamily="34" charset="-128"/>
-                <a:cs typeface="Trebuchet MS"/>
-              </a:rPr>
-              <a:t> </a:t>
-            </a:r>
-            <a:r>
-              <a:rPr sz="2200" dirty="0">
-                <a:solidFill>
-                  <a:srgbClr val="8FEBCC"/>
-                </a:solidFill>
-                <a:latin typeface="Source Han Sans CN" panose="020B0500000000000000" pitchFamily="34" charset="-128"/>
-                <a:ea typeface="Source Han Sans CN" panose="020B0500000000000000" pitchFamily="34" charset="-128"/>
-                <a:cs typeface="Trebuchet MS"/>
-              </a:rPr>
-              <a:t>to open-source</a:t>
-            </a:r>
-            <a:r>
-              <a:rPr lang="zh-CN" altLang="en-US" sz="2200" dirty="0">
-                <a:solidFill>
-                  <a:srgbClr val="8FEBCC"/>
-                </a:solidFill>
-                <a:latin typeface="Source Han Sans CN" panose="020B0500000000000000" pitchFamily="34" charset="-128"/>
-                <a:ea typeface="Source Han Sans CN" panose="020B0500000000000000" pitchFamily="34" charset="-128"/>
-                <a:cs typeface="Trebuchet MS"/>
-              </a:rPr>
-              <a:t> </a:t>
-            </a:r>
-            <a:r>
-              <a:rPr sz="2200" dirty="0">
-                <a:solidFill>
-                  <a:srgbClr val="8FEBCC"/>
-                </a:solidFill>
-                <a:latin typeface="Source Han Sans CN" panose="020B0500000000000000" pitchFamily="34" charset="-128"/>
-                <a:ea typeface="Source Han Sans CN" panose="020B0500000000000000" pitchFamily="34" charset="-128"/>
-                <a:cs typeface="Trebuchet MS"/>
-              </a:rPr>
-              <a:t>projects</a:t>
-            </a:r>
-            <a:endParaRPr sz="2200" dirty="0">
-              <a:latin typeface="Source Han Sans CN" panose="020B0500000000000000" pitchFamily="34" charset="-128"/>
-              <a:ea typeface="Source Han Sans CN" panose="020B0500000000000000" pitchFamily="34" charset="-128"/>
-              <a:cs typeface="Trebuchet MS"/>
-            </a:endParaRPr>
-          </a:p>
-          <a:p>
-            <a:pPr marL="76835">
-              <a:lnSpc>
-                <a:spcPct val="100000"/>
-              </a:lnSpc>
-              <a:spcBef>
-                <a:spcPts val="1860"/>
-              </a:spcBef>
-            </a:pPr>
-            <a:r>
-              <a:rPr sz="1300" u="sng" dirty="0">
-                <a:solidFill>
-                  <a:srgbClr val="8FEBCC"/>
-                </a:solidFill>
-                <a:uFill>
-                  <a:solidFill>
-                    <a:srgbClr val="8FEBCC"/>
-                  </a:solidFill>
-                </a:uFill>
-                <a:latin typeface="Source Han Sans CN" panose="020B0500000000000000" pitchFamily="34" charset="-128"/>
-                <a:ea typeface="Source Han Sans CN" panose="020B0500000000000000" pitchFamily="34" charset="-128"/>
-                <a:cs typeface="Lucida Sans Unicode"/>
-              </a:rPr>
-              <a:t>BCG</a:t>
             </a:r>
             <a:endParaRPr sz="1300" dirty="0">
               <a:latin typeface="Source Han Sans CN" panose="020B0500000000000000" pitchFamily="34" charset="-128"/>
@@ -12455,6 +12388,135 @@
               <a:t>understand innovations impacting the sector.</a:t>
             </a:r>
             <a:endParaRPr sz="1400" dirty="0">
+              <a:latin typeface="Source Han Sans CN" panose="020B0500000000000000" pitchFamily="34" charset="-128"/>
+              <a:ea typeface="Source Han Sans CN" panose="020B0500000000000000" pitchFamily="34" charset="-128"/>
+              <a:cs typeface="Lucida Sans Unicode"/>
+            </a:endParaRPr>
+          </a:p>
+        </p:txBody>
+      </p:sp>
+      <p:sp>
+        <p:nvSpPr>
+          <p:cNvPr id="58" name="object 47">
+            <a:extLst>
+              <a:ext uri="{FF2B5EF4-FFF2-40B4-BE49-F238E27FC236}">
+                <a16:creationId xmlns:a16="http://schemas.microsoft.com/office/drawing/2014/main" id="{FAF1B97B-93C9-CCF4-24F6-E18B2E047449}"/>
+              </a:ext>
+            </a:extLst>
+          </p:cNvPr>
+          <p:cNvSpPr txBox="1"/>
+          <p:nvPr/>
+        </p:nvSpPr>
+        <p:spPr>
+          <a:xfrm>
+            <a:off x="4969597" y="7272476"/>
+            <a:ext cx="3001645" cy="1564595"/>
+          </a:xfrm>
+          <a:prstGeom prst="rect">
+            <a:avLst/>
+          </a:prstGeom>
+        </p:spPr>
+        <p:txBody>
+          <a:bodyPr vert="horz" wrap="square" lIns="0" tIns="114300" rIns="0" bIns="0" rtlCol="0">
+            <a:spAutoFit/>
+          </a:bodyPr>
+          <a:lstStyle/>
+          <a:p>
+            <a:pPr marL="66675" marR="5080">
+              <a:lnSpc>
+                <a:spcPct val="98600"/>
+              </a:lnSpc>
+              <a:spcBef>
+                <a:spcPts val="420"/>
+              </a:spcBef>
+            </a:pPr>
+            <a:r>
+              <a:rPr sz="2200" dirty="0">
+                <a:solidFill>
+                  <a:srgbClr val="8FEBCC"/>
+                </a:solidFill>
+                <a:latin typeface="Source Han Sans CN" panose="020B0500000000000000" pitchFamily="34" charset="-128"/>
+                <a:ea typeface="Source Han Sans CN" panose="020B0500000000000000" pitchFamily="34" charset="-128"/>
+                <a:cs typeface="Trebuchet MS"/>
+              </a:rPr>
+              <a:t>developers contribute</a:t>
+            </a:r>
+            <a:r>
+              <a:rPr lang="zh-CN" altLang="en-US" sz="2200" dirty="0">
+                <a:solidFill>
+                  <a:srgbClr val="8FEBCC"/>
+                </a:solidFill>
+                <a:latin typeface="Source Han Sans CN" panose="020B0500000000000000" pitchFamily="34" charset="-128"/>
+                <a:ea typeface="Source Han Sans CN" panose="020B0500000000000000" pitchFamily="34" charset="-128"/>
+                <a:cs typeface="Trebuchet MS"/>
+              </a:rPr>
+              <a:t> </a:t>
+            </a:r>
+            <a:r>
+              <a:rPr sz="2200" dirty="0">
+                <a:solidFill>
+                  <a:srgbClr val="8FEBCC"/>
+                </a:solidFill>
+                <a:latin typeface="Source Han Sans CN" panose="020B0500000000000000" pitchFamily="34" charset="-128"/>
+                <a:ea typeface="Source Han Sans CN" panose="020B0500000000000000" pitchFamily="34" charset="-128"/>
+                <a:cs typeface="Trebuchet MS"/>
+              </a:rPr>
+              <a:t>to open-source</a:t>
+            </a:r>
+            <a:r>
+              <a:rPr lang="zh-CN" altLang="en-US" sz="2200" dirty="0">
+                <a:solidFill>
+                  <a:srgbClr val="8FEBCC"/>
+                </a:solidFill>
+                <a:latin typeface="Source Han Sans CN" panose="020B0500000000000000" pitchFamily="34" charset="-128"/>
+                <a:ea typeface="Source Han Sans CN" panose="020B0500000000000000" pitchFamily="34" charset="-128"/>
+                <a:cs typeface="Trebuchet MS"/>
+              </a:rPr>
+              <a:t> </a:t>
+            </a:r>
+            <a:r>
+              <a:rPr sz="2200" dirty="0">
+                <a:solidFill>
+                  <a:srgbClr val="8FEBCC"/>
+                </a:solidFill>
+                <a:latin typeface="Source Han Sans CN" panose="020B0500000000000000" pitchFamily="34" charset="-128"/>
+                <a:ea typeface="Source Han Sans CN" panose="020B0500000000000000" pitchFamily="34" charset="-128"/>
+                <a:cs typeface="Trebuchet MS"/>
+              </a:rPr>
+              <a:t>projects</a:t>
+            </a:r>
+            <a:endParaRPr sz="2200" dirty="0">
+              <a:latin typeface="Source Han Sans CN" panose="020B0500000000000000" pitchFamily="34" charset="-128"/>
+              <a:ea typeface="Source Han Sans CN" panose="020B0500000000000000" pitchFamily="34" charset="-128"/>
+              <a:cs typeface="Trebuchet MS"/>
+            </a:endParaRPr>
+          </a:p>
+          <a:p>
+            <a:pPr marL="76835">
+              <a:lnSpc>
+                <a:spcPct val="100000"/>
+              </a:lnSpc>
+              <a:spcBef>
+                <a:spcPts val="1860"/>
+              </a:spcBef>
+            </a:pPr>
+            <a:r>
+              <a:rPr sz="1300" u="sng" dirty="0">
+                <a:solidFill>
+                  <a:srgbClr val="8FEBCC"/>
+                </a:solidFill>
+                <a:uFill>
+                  <a:solidFill>
+                    <a:srgbClr val="8FEBCC"/>
+                  </a:solidFill>
+                </a:uFill>
+                <a:latin typeface="Source Han Sans CN" panose="020B0500000000000000" pitchFamily="34" charset="-128"/>
+                <a:ea typeface="Source Han Sans CN" panose="020B0500000000000000" pitchFamily="34" charset="-128"/>
+                <a:cs typeface="Lucida Sans Unicode"/>
+              </a:rPr>
+              <a:t>BCG</a:t>
+            </a:r>
+            <a:endParaRPr sz="1300" dirty="0">
               <a:latin typeface="Source Han Sans CN" panose="020B0500000000000000" pitchFamily="34" charset="-128"/>
               <a:ea typeface="Source Han Sans CN" panose="020B0500000000000000" pitchFamily="34" charset="-128"/>
               <a:cs typeface="Lucida Sans Unicode"/>
@@ -12610,7 +12672,7 @@
         <p:spPr>
           <a:xfrm>
             <a:off x="9716980" y="6811309"/>
-            <a:ext cx="4701540" cy="3547061"/>
+            <a:ext cx="4701540" cy="3728819"/>
           </a:xfrm>
           <a:prstGeom prst="rect">
             <a:avLst/>
@@ -12620,7 +12682,7 @@
           </a:solidFill>
         </p:spPr>
         <p:txBody>
-          <a:bodyPr vert="horz" wrap="square" lIns="0" tIns="266065" rIns="0" bIns="0" rtlCol="0">
+          <a:bodyPr vert="horz" wrap="square" lIns="0" tIns="266065" rIns="0" bIns="180000" rtlCol="0">
             <a:spAutoFit/>
           </a:bodyPr>
           <a:lstStyle/>
@@ -12937,7 +12999,7 @@
         <p:spPr>
           <a:xfrm>
             <a:off x="14659241" y="2357059"/>
-            <a:ext cx="4701540" cy="2798780"/>
+            <a:ext cx="4701540" cy="2980537"/>
           </a:xfrm>
           <a:prstGeom prst="rect">
             <a:avLst/>
@@ -12947,7 +13009,7 @@
           </a:solidFill>
         </p:spPr>
         <p:txBody>
-          <a:bodyPr vert="horz" wrap="square" lIns="0" tIns="215265" rIns="0" bIns="0" rtlCol="0">
+          <a:bodyPr vert="horz" wrap="square" lIns="0" tIns="215265" rIns="0" bIns="180000" rtlCol="0">
             <a:spAutoFit/>
           </a:bodyPr>
           <a:lstStyle/>
@@ -13168,7 +13230,7 @@
         <p:spPr>
           <a:xfrm>
             <a:off x="14659241" y="5863695"/>
-            <a:ext cx="4701540" cy="4374339"/>
+            <a:ext cx="4701540" cy="4556097"/>
           </a:xfrm>
           <a:prstGeom prst="rect">
             <a:avLst/>
@@ -13178,7 +13240,7 @@
           </a:solidFill>
         </p:spPr>
         <p:txBody>
-          <a:bodyPr vert="horz" wrap="square" lIns="0" tIns="265430" rIns="0" bIns="0" rtlCol="0">
+          <a:bodyPr vert="horz" wrap="square" lIns="0" tIns="265430" rIns="0" bIns="180000" rtlCol="0">
             <a:spAutoFit/>
           </a:bodyPr>
           <a:lstStyle/>
@@ -13478,21 +13540,25 @@
               </a:rPr>
               <a:t>adopted platform for container management,</a:t>
             </a:r>
-            <a:endParaRPr sz="1400" dirty="0">
-              <a:latin typeface="Source Han Sans CN" panose="020B0500000000000000" pitchFamily="34" charset="-128"/>
-              <a:ea typeface="Source Han Sans CN" panose="020B0500000000000000" pitchFamily="34" charset="-128"/>
-              <a:cs typeface="Lucida Sans Unicode"/>
-            </a:endParaRPr>
-          </a:p>
-          <a:p>
-            <a:pPr marL="282575" marR="729615">
-              <a:lnSpc>
-                <a:spcPts val="2090"/>
-              </a:lnSpc>
-              <a:spcBef>
-                <a:spcPts val="20"/>
-              </a:spcBef>
-            </a:pPr>
+            <a:r>
+              <a:rPr lang="zh-CN" altLang="en-US" sz="1400" dirty="0">
+                <a:latin typeface="Source Han Sans CN" panose="020B0500000000000000" pitchFamily="34" charset="-128"/>
+                <a:ea typeface="Source Han Sans CN" panose="020B0500000000000000" pitchFamily="34" charset="-128"/>
+                <a:cs typeface="Lucida Sans Unicode"/>
+              </a:rPr>
+              <a:t> </a:t>
+            </a:r>
+            <a:r>
+              <a:rPr sz="1400">
+                <a:solidFill>
+                  <a:srgbClr val="0D332B"/>
+                </a:solidFill>
+                <a:latin typeface="Source Han Sans CN" panose="020B0500000000000000" pitchFamily="34" charset="-128"/>
+                <a:ea typeface="Source Han Sans CN" panose="020B0500000000000000" pitchFamily="34" charset="-128"/>
+                <a:cs typeface="Lucida Sans Unicode"/>
+              </a:rPr>
+              <a:t>whether </a:t>
+            </a:r>
             <a:r>
               <a:rPr sz="1400" dirty="0">
                 <a:solidFill>
@@ -13502,7 +13568,7 @@
                 <a:ea typeface="Source Han Sans CN" panose="020B0500000000000000" pitchFamily="34" charset="-128"/>
                 <a:cs typeface="Lucida Sans Unicode"/>
               </a:rPr>
-              <a:t>whether the application runs on-premises,</a:t>
+              <a:t>the application runs on-premises,</a:t>
             </a:r>
             <a:r>
               <a:rPr lang="zh-CN" altLang="en-US" sz="1400" dirty="0">
@@ -13543,7 +13609,7 @@
         <p:spPr>
           <a:xfrm>
             <a:off x="9716980" y="743432"/>
-            <a:ext cx="4701540" cy="5606984"/>
+            <a:ext cx="4701540" cy="5812595"/>
           </a:xfrm>
           <a:prstGeom prst="rect">
             <a:avLst/>
@@ -13553,7 +13619,7 @@
           </a:solidFill>
         </p:spPr>
         <p:txBody>
-          <a:bodyPr vert="horz" wrap="square" lIns="0" tIns="332105" rIns="0" bIns="0" rtlCol="0">
+          <a:bodyPr vert="horz" wrap="square" lIns="0" tIns="332105" rIns="0" bIns="180000" rtlCol="0">
             <a:spAutoFit/>
           </a:bodyPr>
           <a:lstStyle/>
@@ -13608,7 +13674,7 @@
           <a:p>
             <a:pPr marL="486409" marR="593090" indent="-189230">
               <a:lnSpc>
-                <a:spcPct val="125699"/>
+                <a:spcPts val="1500"/>
               </a:lnSpc>
               <a:spcBef>
                 <a:spcPts val="1075"/>
@@ -13651,19 +13717,19 @@
               </a:rPr>
               <a:t>in-car apps</a:t>
             </a:r>
-            <a:endParaRPr sz="1400" dirty="0">
+            <a:endParaRPr lang="en-US" sz="1400" dirty="0">
               <a:latin typeface="Source Han Sans CN" panose="020B0500000000000000" pitchFamily="34" charset="-128"/>
               <a:ea typeface="Source Han Sans CN" panose="020B0500000000000000" pitchFamily="34" charset="-128"/>
               <a:cs typeface="Lucida Sans Unicode"/>
             </a:endParaRPr>
           </a:p>
           <a:p>
-            <a:pPr marL="486409" marR="551180" indent="-189230">
+            <a:pPr marL="486409" marR="593090" indent="-189230">
               <a:lnSpc>
-                <a:spcPts val="2110"/>
+                <a:spcPts val="1500"/>
               </a:lnSpc>
               <a:spcBef>
-                <a:spcPts val="120"/>
+                <a:spcPts val="1075"/>
               </a:spcBef>
               <a:buChar char="•"/>
               <a:tabLst>
@@ -13725,19 +13791,19 @@
               </a:rPr>
               <a:t>leading container management platform</a:t>
             </a:r>
-            <a:endParaRPr sz="1400" dirty="0">
+            <a:endParaRPr lang="en-US" sz="1400" dirty="0">
               <a:latin typeface="Source Han Sans CN" panose="020B0500000000000000" pitchFamily="34" charset="-128"/>
               <a:ea typeface="Source Han Sans CN" panose="020B0500000000000000" pitchFamily="34" charset="-128"/>
               <a:cs typeface="Lucida Sans Unicode"/>
             </a:endParaRPr>
           </a:p>
           <a:p>
-            <a:pPr marL="486409" indent="-188595">
+            <a:pPr marL="486409" marR="593090" indent="-189230">
               <a:lnSpc>
-                <a:spcPct val="100000"/>
+                <a:spcPts val="1500"/>
               </a:lnSpc>
               <a:spcBef>
-                <a:spcPts val="75"/>
+                <a:spcPts val="1075"/>
               </a:spcBef>
               <a:buChar char="•"/>
               <a:tabLst>
@@ -13755,45 +13821,38 @@
               </a:rPr>
               <a:t>SLES – the recommended Operating</a:t>
             </a:r>
-            <a:endParaRPr sz="1400" dirty="0">
+            <a:r>
+              <a:rPr lang="zh-CN" altLang="en-US" sz="1400" dirty="0">
+                <a:latin typeface="Source Han Sans CN" panose="020B0500000000000000" pitchFamily="34" charset="-128"/>
+                <a:ea typeface="Source Han Sans CN" panose="020B0500000000000000" pitchFamily="34" charset="-128"/>
+                <a:cs typeface="Lucida Sans Unicode"/>
+              </a:rPr>
+              <a:t> </a:t>
+            </a:r>
+            <a:r>
+              <a:rPr sz="1400" dirty="0">
+                <a:solidFill>
+                  <a:srgbClr val="0D332B"/>
+                </a:solidFill>
+                <a:latin typeface="Source Han Sans CN" panose="020B0500000000000000" pitchFamily="34" charset="-128"/>
+                <a:ea typeface="Source Han Sans CN" panose="020B0500000000000000" pitchFamily="34" charset="-128"/>
+                <a:cs typeface="Lucida Sans Unicode"/>
+              </a:rPr>
+              <a:t>System to run SAP</a:t>
+            </a:r>
+            <a:endParaRPr lang="en-US" sz="1400" dirty="0">
               <a:latin typeface="Source Han Sans CN" panose="020B0500000000000000" pitchFamily="34" charset="-128"/>
               <a:ea typeface="Source Han Sans CN" panose="020B0500000000000000" pitchFamily="34" charset="-128"/>
               <a:cs typeface="Lucida Sans Unicode"/>
             </a:endParaRPr>
           </a:p>
           <a:p>
-            <a:pPr marL="486409">
+            <a:pPr marL="486409" marR="593090" indent="-189230">
               <a:lnSpc>
-                <a:spcPct val="100000"/>
+                <a:spcPts val="1500"/>
               </a:lnSpc>
               <a:spcBef>
-                <a:spcPts val="430"/>
-              </a:spcBef>
-            </a:pPr>
-            <a:r>
-              <a:rPr sz="1400" dirty="0">
-                <a:solidFill>
-                  <a:srgbClr val="0D332B"/>
-                </a:solidFill>
-                <a:latin typeface="Source Han Sans CN" panose="020B0500000000000000" pitchFamily="34" charset="-128"/>
-                <a:ea typeface="Source Han Sans CN" panose="020B0500000000000000" pitchFamily="34" charset="-128"/>
-                <a:cs typeface="Lucida Sans Unicode"/>
-              </a:rPr>
-              <a:t>System to run SAP</a:t>
-            </a:r>
-            <a:endParaRPr sz="1400" dirty="0">
-              <a:latin typeface="Source Han Sans CN" panose="020B0500000000000000" pitchFamily="34" charset="-128"/>
-              <a:ea typeface="Source Han Sans CN" panose="020B0500000000000000" pitchFamily="34" charset="-128"/>
-              <a:cs typeface="Lucida Sans Unicode"/>
-            </a:endParaRPr>
-          </a:p>
-          <a:p>
-            <a:pPr marL="486409" indent="-189230">
-              <a:lnSpc>
-                <a:spcPct val="100000"/>
-              </a:lnSpc>
-              <a:spcBef>
-                <a:spcPts val="505"/>
+                <a:spcPts val="1075"/>
               </a:spcBef>
               <a:buChar char="•"/>
               <a:tabLst>
@@ -13811,19 +13870,19 @@
               </a:rPr>
               <a:t>SLE Micro – the Linux OS for Edge</a:t>
             </a:r>
-            <a:endParaRPr sz="1400" dirty="0">
+            <a:endParaRPr lang="en-US" sz="1400" dirty="0">
               <a:latin typeface="Source Han Sans CN" panose="020B0500000000000000" pitchFamily="34" charset="-128"/>
               <a:ea typeface="Source Han Sans CN" panose="020B0500000000000000" pitchFamily="34" charset="-128"/>
               <a:cs typeface="Lucida Sans Unicode"/>
             </a:endParaRPr>
           </a:p>
           <a:p>
-            <a:pPr marL="486409" indent="-189230">
+            <a:pPr marL="486409" marR="593090" indent="-189230">
               <a:lnSpc>
-                <a:spcPct val="100000"/>
+                <a:spcPts val="1500"/>
               </a:lnSpc>
               <a:spcBef>
-                <a:spcPts val="434"/>
+                <a:spcPts val="1075"/>
               </a:spcBef>
               <a:buChar char="•"/>
               <a:tabLst>
@@ -14016,8 +14075,8 @@
         </p:nvSpPr>
         <p:spPr>
           <a:xfrm>
-            <a:off x="730731" y="6995159"/>
-            <a:ext cx="4270375" cy="3241144"/>
+            <a:off x="736969" y="6811309"/>
+            <a:ext cx="4270375" cy="4141518"/>
           </a:xfrm>
           <a:prstGeom prst="rect">
             <a:avLst/>
@@ -14090,9 +14149,51 @@
                 <a:ea typeface="Source Han Sans CN" panose="020B0500000000000000" pitchFamily="34" charset="-128"/>
                 <a:cs typeface="Lucida Sans Unicode"/>
               </a:rPr>
-              <a:t>sector. We were the first Enterprise Linux
-distributor to go to market in 1992 and
-currently, 12 of the 15 largest automotive</a:t>
+              <a:t>sector. We were the first Enterprise Linux</a:t>
+            </a:r>
+            <a:r>
+              <a:rPr lang="zh-CN" altLang="en-US" sz="1700" dirty="0">
+                <a:solidFill>
+                  <a:srgbClr val="0D332B"/>
+                </a:solidFill>
+                <a:latin typeface="Source Han Sans CN" panose="020B0500000000000000" pitchFamily="34" charset="-128"/>
+                <a:ea typeface="Source Han Sans CN" panose="020B0500000000000000" pitchFamily="34" charset="-128"/>
+                <a:cs typeface="Lucida Sans Unicode"/>
+              </a:rPr>
+              <a:t> </a:t>
+            </a:r>
+            <a:r>
+              <a:rPr sz="1700" dirty="0">
+                <a:solidFill>
+                  <a:srgbClr val="0D332B"/>
+                </a:solidFill>
+                <a:latin typeface="Source Han Sans CN" panose="020B0500000000000000" pitchFamily="34" charset="-128"/>
+                <a:ea typeface="Source Han Sans CN" panose="020B0500000000000000" pitchFamily="34" charset="-128"/>
+                <a:cs typeface="Lucida Sans Unicode"/>
+              </a:rPr>
+              <a:t>distributor to go to market in 1992 and</a:t>
+            </a:r>
+            <a:r>
+              <a:rPr lang="zh-CN" altLang="en-US" sz="1700" dirty="0">
+                <a:solidFill>
+                  <a:srgbClr val="0D332B"/>
+                </a:solidFill>
+                <a:latin typeface="Source Han Sans CN" panose="020B0500000000000000" pitchFamily="34" charset="-128"/>
+                <a:ea typeface="Source Han Sans CN" panose="020B0500000000000000" pitchFamily="34" charset="-128"/>
+                <a:cs typeface="Lucida Sans Unicode"/>
+              </a:rPr>
+              <a:t> </a:t>
+            </a:r>
+            <a:r>
+              <a:rPr sz="1700" dirty="0">
+                <a:solidFill>
+                  <a:srgbClr val="0D332B"/>
+                </a:solidFill>
+                <a:latin typeface="Source Han Sans CN" panose="020B0500000000000000" pitchFamily="34" charset="-128"/>
+                <a:ea typeface="Source Han Sans CN" panose="020B0500000000000000" pitchFamily="34" charset="-128"/>
+                <a:cs typeface="Lucida Sans Unicode"/>
+              </a:rPr>
+              <a:t>currently, 12 of the 15 largest automotive</a:t>
             </a:r>
             <a:r>
               <a:rPr lang="zh-CN" altLang="en-US" sz="1700" dirty="0">
@@ -14206,7 +14307,73 @@
                 <a:ea typeface="Source Han Sans CN" panose="020B0500000000000000" pitchFamily="34" charset="-128"/>
                 <a:cs typeface="Lucida Sans Unicode"/>
               </a:rPr>
-              <a:t>Edge systems and network capabilities.</a:t>
+              <a:t>Edge systems and network</a:t>
+            </a:r>
+            <a:r>
+              <a:rPr lang="zh-CN" altLang="en-US" sz="1700" dirty="0">
+                <a:solidFill>
+                  <a:srgbClr val="0D332B"/>
+                </a:solidFill>
+                <a:latin typeface="Source Han Sans CN" panose="020B0500000000000000" pitchFamily="34" charset="-128"/>
+                <a:ea typeface="Source Han Sans CN" panose="020B0500000000000000" pitchFamily="34" charset="-128"/>
+                <a:cs typeface="Lucida Sans Unicode"/>
+              </a:rPr>
+              <a:t> </a:t>
+            </a:r>
+            <a:r>
+              <a:rPr sz="1700" dirty="0">
+                <a:solidFill>
+                  <a:srgbClr val="0D332B"/>
+                </a:solidFill>
+                <a:latin typeface="Source Han Sans CN" panose="020B0500000000000000" pitchFamily="34" charset="-128"/>
+                <a:ea typeface="Source Han Sans CN" panose="020B0500000000000000" pitchFamily="34" charset="-128"/>
+                <a:cs typeface="Lucida Sans Unicode"/>
+              </a:rPr>
+              <a:t>capabilities</a:t>
+            </a:r>
+            <a:r>
+              <a:rPr lang="zh-CN" altLang="en-US" sz="1700" dirty="0">
+                <a:solidFill>
+                  <a:srgbClr val="0D332B"/>
+                </a:solidFill>
+                <a:latin typeface="Source Han Sans CN" panose="020B0500000000000000" pitchFamily="34" charset="-128"/>
+                <a:ea typeface="Source Han Sans CN" panose="020B0500000000000000" pitchFamily="34" charset="-128"/>
+                <a:cs typeface="Lucida Sans Unicode"/>
+              </a:rPr>
+              <a:t> </a:t>
+            </a:r>
+            <a:r>
+              <a:rPr lang="en" altLang="zh-CN" sz="1700" dirty="0">
+                <a:solidFill>
+                  <a:srgbClr val="0D332B"/>
+                </a:solidFill>
+                <a:latin typeface="Source Han Sans CN" panose="020B0500000000000000" pitchFamily="34" charset="-128"/>
+                <a:ea typeface="Source Han Sans CN" panose="020B0500000000000000" pitchFamily="34" charset="-128"/>
+                <a:cs typeface="Lucida Sans Unicode"/>
+              </a:rPr>
+              <a:t>that have unmatched security, intelligent computing and resilient</a:t>
+            </a:r>
+            <a:r>
+              <a:rPr lang="zh-CN" altLang="en-US" sz="1700" dirty="0">
+                <a:solidFill>
+                  <a:srgbClr val="0D332B"/>
+                </a:solidFill>
+                <a:latin typeface="Source Han Sans CN" panose="020B0500000000000000" pitchFamily="34" charset="-128"/>
+                <a:ea typeface="Source Han Sans CN" panose="020B0500000000000000" pitchFamily="34" charset="-128"/>
+                <a:cs typeface="Lucida Sans Unicode"/>
+              </a:rPr>
+              <a:t> </a:t>
+            </a:r>
+            <a:r>
+              <a:rPr lang="en" altLang="zh-CN" sz="1700" dirty="0">
+                <a:solidFill>
+                  <a:srgbClr val="0D332B"/>
+                </a:solidFill>
+                <a:latin typeface="Source Han Sans CN" panose="020B0500000000000000" pitchFamily="34" charset="-128"/>
+                <a:ea typeface="Source Han Sans CN" panose="020B0500000000000000" pitchFamily="34" charset="-128"/>
+                <a:cs typeface="Lucida Sans Unicode"/>
+              </a:rPr>
+              <a:t>open-source development.</a:t>
             </a:r>
             <a:endParaRPr sz="1700" dirty="0">
               <a:latin typeface="Source Han Sans CN" panose="020B0500000000000000" pitchFamily="34" charset="-128"/>
@@ -14224,8 +14391,8 @@
         </p:nvSpPr>
         <p:spPr>
           <a:xfrm>
-            <a:off x="5463673" y="6995159"/>
-            <a:ext cx="3696335" cy="3504677"/>
+            <a:off x="5469911" y="6811309"/>
+            <a:ext cx="3696335" cy="2422586"/>
           </a:xfrm>
           <a:prstGeom prst="rect">
             <a:avLst/>
@@ -14236,77 +14403,6 @@
             <a:spAutoFit/>
           </a:bodyPr>
           <a:lstStyle/>
-          <a:p>
-            <a:pPr marL="12700" marR="180975">
-              <a:lnSpc>
-                <a:spcPct val="115300"/>
-              </a:lnSpc>
-              <a:spcBef>
-                <a:spcPts val="145"/>
-              </a:spcBef>
-            </a:pPr>
-            <a:r>
-              <a:rPr sz="1700" dirty="0">
-                <a:solidFill>
-                  <a:srgbClr val="0D332B"/>
-                </a:solidFill>
-                <a:latin typeface="Source Han Sans CN" panose="020B0500000000000000" pitchFamily="34" charset="-128"/>
-                <a:ea typeface="Source Han Sans CN" panose="020B0500000000000000" pitchFamily="34" charset="-128"/>
-                <a:cs typeface="Lucida Sans Unicode"/>
-              </a:rPr>
-              <a:t>that have unmatched security,</a:t>
-            </a:r>
-            <a:r>
-              <a:rPr lang="zh-CN" altLang="en-US" sz="1700" dirty="0">
-                <a:solidFill>
-                  <a:srgbClr val="0D332B"/>
-                </a:solidFill>
-                <a:latin typeface="Source Han Sans CN" panose="020B0500000000000000" pitchFamily="34" charset="-128"/>
-                <a:ea typeface="Source Han Sans CN" panose="020B0500000000000000" pitchFamily="34" charset="-128"/>
-                <a:cs typeface="Lucida Sans Unicode"/>
-              </a:rPr>
-              <a:t> </a:t>
-            </a:r>
-            <a:r>
-              <a:rPr sz="1700" dirty="0">
-                <a:solidFill>
-                  <a:srgbClr val="0D332B"/>
-                </a:solidFill>
-                <a:latin typeface="Source Han Sans CN" panose="020B0500000000000000" pitchFamily="34" charset="-128"/>
-                <a:ea typeface="Source Han Sans CN" panose="020B0500000000000000" pitchFamily="34" charset="-128"/>
-                <a:cs typeface="Lucida Sans Unicode"/>
-              </a:rPr>
-              <a:t>intelligent computing and resilient
-open</a:t>
-            </a:r>
-            <a:r>
-              <a:rPr lang="en-US" altLang="zh-CN" sz="1700" dirty="0">
-                <a:solidFill>
-                  <a:srgbClr val="0D332B"/>
-                </a:solidFill>
-                <a:latin typeface="Source Han Sans CN" panose="020B0500000000000000" pitchFamily="34" charset="-128"/>
-                <a:ea typeface="Source Han Sans CN" panose="020B0500000000000000" pitchFamily="34" charset="-128"/>
-                <a:cs typeface="Lucida Sans Unicode"/>
-              </a:rPr>
-              <a:t>-</a:t>
-            </a:r>
-            <a:r>
-              <a:rPr sz="1700" dirty="0">
-                <a:solidFill>
-                  <a:srgbClr val="0D332B"/>
-                </a:solidFill>
-                <a:latin typeface="Source Han Sans CN" panose="020B0500000000000000" pitchFamily="34" charset="-128"/>
-                <a:ea typeface="Source Han Sans CN" panose="020B0500000000000000" pitchFamily="34" charset="-128"/>
-                <a:cs typeface="Lucida Sans Unicode"/>
-              </a:rPr>
-              <a:t>source development.</a:t>
-            </a:r>
-            <a:endParaRPr sz="1700" dirty="0">
-              <a:latin typeface="Source Han Sans CN" panose="020B0500000000000000" pitchFamily="34" charset="-128"/>
-              <a:ea typeface="Source Han Sans CN" panose="020B0500000000000000" pitchFamily="34" charset="-128"/>
-              <a:cs typeface="Lucida Sans Unicode"/>
-            </a:endParaRPr>
-          </a:p>
           <a:p>
             <a:pPr marL="12700" marR="5080">
               <a:lnSpc>
@@ -26354,6 +26450,111 @@
           <a:chExt cx="0" cy="0"/>
         </a:xfrm>
       </p:grpSpPr>
+      <p:grpSp>
+        <p:nvGrpSpPr>
+          <p:cNvPr id="8" name="object 2">
+            <a:extLst>
+              <a:ext uri="{FF2B5EF4-FFF2-40B4-BE49-F238E27FC236}">
+                <a16:creationId xmlns:a16="http://schemas.microsoft.com/office/drawing/2014/main" id="{07D13BC0-4102-4DC4-9D3E-2EF156BFB5BF}"/>
+              </a:ext>
+            </a:extLst>
+          </p:cNvPr>
+          <p:cNvGrpSpPr/>
+          <p:nvPr/>
+        </p:nvGrpSpPr>
+        <p:grpSpPr>
+          <a:xfrm>
+            <a:off x="0" y="10"/>
+            <a:ext cx="20104100" cy="11308715"/>
+            <a:chOff x="0" y="10"/>
+            <a:chExt cx="20104100" cy="11308715"/>
+          </a:xfrm>
+        </p:grpSpPr>
+        <p:pic>
+          <p:nvPicPr>
+            <p:cNvPr id="9" name="object 3">
+              <a:extLst>
+                <a:ext uri="{FF2B5EF4-FFF2-40B4-BE49-F238E27FC236}">
+                  <a16:creationId xmlns:a16="http://schemas.microsoft.com/office/drawing/2014/main" id="{824C8D2B-0701-F5E5-634C-85F89E7F8209}"/>
+                </a:ext>
+              </a:extLst>
+            </p:cNvPr>
+            <p:cNvPicPr/>
+            <p:nvPr/>
+          </p:nvPicPr>
+          <p:blipFill>
+            <a:blip r:embed="rId2" cstate="print"/>
+            <a:stretch>
+              <a:fillRect/>
+            </a:stretch>
+          </p:blipFill>
+          <p:spPr>
+            <a:xfrm>
+              <a:off x="0" y="10"/>
+              <a:ext cx="20104074" cy="11308534"/>
+            </a:xfrm>
+            <a:prstGeom prst="rect">
+              <a:avLst/>
+            </a:prstGeom>
+          </p:spPr>
+        </p:pic>
+        <p:pic>
+          <p:nvPicPr>
+            <p:cNvPr id="10" name="object 4">
+              <a:extLst>
+                <a:ext uri="{FF2B5EF4-FFF2-40B4-BE49-F238E27FC236}">
+                  <a16:creationId xmlns:a16="http://schemas.microsoft.com/office/drawing/2014/main" id="{1E7F571A-88E1-9D10-0F9B-FBBCECF0B40B}"/>
+                </a:ext>
+              </a:extLst>
+            </p:cNvPr>
+            <p:cNvPicPr/>
+            <p:nvPr/>
+          </p:nvPicPr>
+          <p:blipFill>
+            <a:blip r:embed="rId3" cstate="print"/>
+            <a:stretch>
+              <a:fillRect/>
+            </a:stretch>
+          </p:blipFill>
+          <p:spPr>
+            <a:xfrm>
+              <a:off x="18721945" y="697600"/>
+              <a:ext cx="594740" cy="384540"/>
+            </a:xfrm>
+            <a:prstGeom prst="rect">
+              <a:avLst/>
+            </a:prstGeom>
+          </p:spPr>
+        </p:pic>
+        <p:pic>
+          <p:nvPicPr>
+            <p:cNvPr id="11" name="object 5">
+              <a:extLst>
+                <a:ext uri="{FF2B5EF4-FFF2-40B4-BE49-F238E27FC236}">
+                  <a16:creationId xmlns:a16="http://schemas.microsoft.com/office/drawing/2014/main" id="{5D6A1DD8-9479-6B49-BACE-447BB2D079B4}"/>
+                </a:ext>
+              </a:extLst>
+            </p:cNvPr>
+            <p:cNvPicPr/>
+            <p:nvPr/>
+          </p:nvPicPr>
+          <p:blipFill>
+            <a:blip r:embed="rId4" cstate="print"/>
+            <a:stretch>
+              <a:fillRect/>
+            </a:stretch>
+          </p:blipFill>
+          <p:spPr>
+            <a:xfrm>
+              <a:off x="865632" y="905256"/>
+              <a:ext cx="1673352" cy="304800"/>
+            </a:xfrm>
+            <a:prstGeom prst="rect">
+              <a:avLst/>
+            </a:prstGeom>
+          </p:spPr>
+        </p:pic>
+      </p:grpSp>
       <p:sp>
         <p:nvSpPr>
           <p:cNvPr id="2" name="object 2"/>
@@ -26402,7 +26603,7 @@
           <a:bodyPr wrap="square" lIns="0" tIns="0" rIns="0" bIns="0" rtlCol="0"/>
           <a:lstStyle/>
           <a:p>
-            <a:endParaRPr>
+            <a:endParaRPr dirty="0">
               <a:latin typeface="Source Han Sans CN" panose="020B0500000000000000" pitchFamily="34" charset="-128"/>
               <a:ea typeface="Source Han Sans CN" panose="020B0500000000000000" pitchFamily="34" charset="-128"/>
             </a:endParaRPr>
@@ -26416,7 +26617,7 @@
           <p:nvPr/>
         </p:nvPicPr>
         <p:blipFill>
-          <a:blip r:embed="rId2" cstate="print"/>
+          <a:blip r:embed="rId3" cstate="print"/>
           <a:stretch>
             <a:fillRect/>
           </a:stretch>
@@ -26438,7 +26639,7 @@
           <p:nvPr/>
         </p:nvPicPr>
         <p:blipFill>
-          <a:blip r:embed="rId3" cstate="print"/>
+          <a:blip r:embed="rId4" cstate="print"/>
           <a:stretch>
             <a:fillRect/>
           </a:stretch>
@@ -26516,7 +26717,7 @@
                 <a:latin typeface="Source Han Sans CN" panose="020B0500000000000000" pitchFamily="34" charset="-128"/>
                 <a:ea typeface="Source Han Sans CN" panose="020B0500000000000000" pitchFamily="34" charset="-128"/>
                 <a:cs typeface="Trebuchet MS"/>
-                <a:hlinkClick r:id="rId4">
+                <a:hlinkClick r:id="rId5">
                   <a:extLst>
                     <a:ext uri="{A12FA001-AC4F-418D-AE19-62706E023703}">
                       <ahyp:hlinkClr xmlns:ahyp="http://schemas.microsoft.com/office/drawing/2018/hyperlinkcolor" val="tx"/>

</xml_diff>